<commit_message>
Updated Documentation & Contributions
Completed documentation for Grammar, Parser, Interpreter
</commit_message>
<xml_diff>
--- a/doc/Documentation.pptx
+++ b/doc/Documentation.pptx
@@ -1,23 +1,33 @@
 
 <file path=ppt/presentation.xml><?xml version="1.0" encoding="utf-8"?>
-<p:presentation xmlns:a="http://schemas.openxmlformats.org/drawingml/2006/main" xmlns:r="http://schemas.openxmlformats.org/officeDocument/2006/relationships" xmlns:mc="http://schemas.openxmlformats.org/markup-compatibility/2006" xmlns:mv="urn:schemas-microsoft-com:mac:vml" xmlns:p="http://schemas.openxmlformats.org/presentationml/2006/main" xmlns:c="http://schemas.openxmlformats.org/drawingml/2006/chart" xmlns:dgm="http://schemas.openxmlformats.org/drawingml/2006/diagram" xmlns:o="urn:schemas-microsoft-com:office:office" xmlns:v="urn:schemas-microsoft-com:vml" xmlns:pvml="urn:schemas-microsoft-com:office:powerpoint" xmlns:com="http://schemas.openxmlformats.org/drawingml/2006/compatibility" xmlns:p14="http://schemas.microsoft.com/office/powerpoint/2010/main" xmlns:p15="http://schemas.microsoft.com/office/powerpoint/2012/main" xmlns:ahyp="http://schemas.microsoft.com/office/drawing/2018/hyperlinkcolor" autoCompressPictures="0" strictFirstAndLastChars="0" saveSubsetFonts="1">
+<p:presentation xmlns:a="http://schemas.openxmlformats.org/drawingml/2006/main" xmlns:r="http://schemas.openxmlformats.org/officeDocument/2006/relationships" xmlns:mc="http://schemas.openxmlformats.org/markup-compatibility/2006" xmlns:mv="urn:schemas-microsoft-com:mac:vml" xmlns:p="http://schemas.openxmlformats.org/presentationml/2006/main" xmlns:c="http://schemas.openxmlformats.org/drawingml/2006/chart" xmlns:dgm="http://schemas.openxmlformats.org/drawingml/2006/diagram" xmlns:o="urn:schemas-microsoft-com:office:office" xmlns:v="urn:schemas-microsoft-com:vml" xmlns:pvml="urn:schemas-microsoft-com:office:powerpoint" xmlns:com="http://schemas.openxmlformats.org/drawingml/2006/compatibility" xmlns:p14="http://schemas.microsoft.com/office/powerpoint/2010/main" xmlns:p15="http://schemas.microsoft.com/office/powerpoint/2012/main" xmlns:ahyp="http://schemas.microsoft.com/office/drawing/2018/hyperlinkcolor" autoCompressPictures="0" embedTrueTypeFonts="1" strictFirstAndLastChars="0" saveSubsetFonts="1">
   <p:sldMasterIdLst>
-    <p:sldMasterId id="2147483659" r:id="rId4"/>
+    <p:sldMasterId id="2147483659" r:id="rId5"/>
   </p:sldMasterIdLst>
   <p:notesMasterIdLst>
-    <p:notesMasterId r:id="rId5"/>
+    <p:notesMasterId r:id="rId6"/>
   </p:notesMasterIdLst>
   <p:sldIdLst>
-    <p:sldId id="256" r:id="rId6"/>
-    <p:sldId id="257" r:id="rId7"/>
-    <p:sldId id="258" r:id="rId8"/>
-    <p:sldId id="259" r:id="rId9"/>
-    <p:sldId id="260" r:id="rId10"/>
-    <p:sldId id="261" r:id="rId11"/>
-    <p:sldId id="262" r:id="rId12"/>
+    <p:sldId id="256" r:id="rId7"/>
+    <p:sldId id="257" r:id="rId8"/>
+    <p:sldId id="258" r:id="rId9"/>
+    <p:sldId id="259" r:id="rId10"/>
+    <p:sldId id="260" r:id="rId11"/>
+    <p:sldId id="261" r:id="rId12"/>
+    <p:sldId id="262" r:id="rId13"/>
+    <p:sldId id="263" r:id="rId14"/>
   </p:sldIdLst>
   <p:sldSz cy="5143500" cx="9144000"/>
   <p:notesSz cx="6858000" cy="9144000"/>
+  <p:embeddedFontLst>
+    <p:embeddedFont>
+      <p:font typeface="Roboto Mono"/>
+      <p:regular r:id="rId15"/>
+      <p:bold r:id="rId16"/>
+      <p:italic r:id="rId17"/>
+      <p:boldItalic r:id="rId18"/>
+    </p:embeddedFont>
+  </p:embeddedFontLst>
   <p:defaultTextStyle>
     <a:defPPr lvl="0" marR="0" rtl="0" algn="l">
       <a:lnSpc>
@@ -264,6 +274,42 @@
     </p:ext>
   </p:extLst>
 </p:presentation>
+</file>
+
+<file path=ppt/commentAuthors.xml><?xml version="1.0" encoding="utf-8"?>
+<p:cmAuthorLst xmlns:a="http://schemas.openxmlformats.org/drawingml/2006/main" xmlns:r="http://schemas.openxmlformats.org/officeDocument/2006/relationships" xmlns:mc="http://schemas.openxmlformats.org/markup-compatibility/2006" xmlns:mv="urn:schemas-microsoft-com:mac:vml" xmlns:p="http://schemas.openxmlformats.org/presentationml/2006/main" xmlns:c="http://schemas.openxmlformats.org/drawingml/2006/chart" xmlns:dgm="http://schemas.openxmlformats.org/drawingml/2006/diagram" xmlns:o="urn:schemas-microsoft-com:office:office" xmlns:v="urn:schemas-microsoft-com:vml" xmlns:pvml="urn:schemas-microsoft-com:office:powerpoint" xmlns:com="http://schemas.openxmlformats.org/drawingml/2006/compatibility" xmlns:p14="http://schemas.microsoft.com/office/powerpoint/2010/main" xmlns:p15="http://schemas.microsoft.com/office/powerpoint/2012/main" xmlns:ahyp="http://schemas.microsoft.com/office/drawing/2018/hyperlinkcolor">
+  <p:cmAuthor clrIdx="0" id="0" initials="" lastIdx="3" name="Angela Zhang"/>
+</p:cmAuthorLst>
+</file>
+
+<file path=ppt/comments/comment1.xml><?xml version="1.0" encoding="utf-8"?>
+<p:cmLst xmlns:a="http://schemas.openxmlformats.org/drawingml/2006/main" xmlns:r="http://schemas.openxmlformats.org/officeDocument/2006/relationships" xmlns:mc="http://schemas.openxmlformats.org/markup-compatibility/2006" xmlns:mv="urn:schemas-microsoft-com:mac:vml" xmlns:p="http://schemas.openxmlformats.org/presentationml/2006/main" xmlns:c="http://schemas.openxmlformats.org/drawingml/2006/chart" xmlns:dgm="http://schemas.openxmlformats.org/drawingml/2006/diagram" xmlns:o="urn:schemas-microsoft-com:office:office" xmlns:v="urn:schemas-microsoft-com:vml" xmlns:pvml="urn:schemas-microsoft-com:office:powerpoint" xmlns:com="http://schemas.openxmlformats.org/drawingml/2006/compatibility" xmlns:p14="http://schemas.microsoft.com/office/powerpoint/2010/main" xmlns:p15="http://schemas.microsoft.com/office/powerpoint/2012/main" xmlns:ahyp="http://schemas.microsoft.com/office/drawing/2018/hyperlinkcolor">
+  <p:cm authorId="0" idx="1" dt="2024-04-23T20:07:00.154">
+    <p:pos x="6000" y="0"/>
+    <p:text>@anallasa@asu.edu
+_Assigned to anallasa@asu.edu_</p:text>
+  </p:cm>
+</p:cmLst>
+</file>
+
+<file path=ppt/comments/comment2.xml><?xml version="1.0" encoding="utf-8"?>
+<p:cmLst xmlns:a="http://schemas.openxmlformats.org/drawingml/2006/main" xmlns:r="http://schemas.openxmlformats.org/officeDocument/2006/relationships" xmlns:mc="http://schemas.openxmlformats.org/markup-compatibility/2006" xmlns:mv="urn:schemas-microsoft-com:mac:vml" xmlns:p="http://schemas.openxmlformats.org/presentationml/2006/main" xmlns:c="http://schemas.openxmlformats.org/drawingml/2006/chart" xmlns:dgm="http://schemas.openxmlformats.org/drawingml/2006/diagram" xmlns:o="urn:schemas-microsoft-com:office:office" xmlns:v="urn:schemas-microsoft-com:vml" xmlns:pvml="urn:schemas-microsoft-com:office:powerpoint" xmlns:com="http://schemas.openxmlformats.org/drawingml/2006/compatibility" xmlns:p14="http://schemas.microsoft.com/office/powerpoint/2010/main" xmlns:p15="http://schemas.microsoft.com/office/powerpoint/2012/main" xmlns:ahyp="http://schemas.microsoft.com/office/drawing/2018/hyperlinkcolor">
+  <p:cm authorId="0" idx="2" dt="2024-04-23T18:26:20.471">
+    <p:pos x="6000" y="0"/>
+    <p:text>@boanli@asu.edu
+_Assigned to boanli@asu.edu_</p:text>
+  </p:cm>
+</p:cmLst>
+</file>
+
+<file path=ppt/comments/comment3.xml><?xml version="1.0" encoding="utf-8"?>
+<p:cmLst xmlns:a="http://schemas.openxmlformats.org/drawingml/2006/main" xmlns:r="http://schemas.openxmlformats.org/officeDocument/2006/relationships" xmlns:mc="http://schemas.openxmlformats.org/markup-compatibility/2006" xmlns:mv="urn:schemas-microsoft-com:mac:vml" xmlns:p="http://schemas.openxmlformats.org/presentationml/2006/main" xmlns:c="http://schemas.openxmlformats.org/drawingml/2006/chart" xmlns:dgm="http://schemas.openxmlformats.org/drawingml/2006/diagram" xmlns:o="urn:schemas-microsoft-com:office:office" xmlns:v="urn:schemas-microsoft-com:vml" xmlns:pvml="urn:schemas-microsoft-com:office:powerpoint" xmlns:com="http://schemas.openxmlformats.org/drawingml/2006/compatibility" xmlns:p14="http://schemas.microsoft.com/office/powerpoint/2010/main" xmlns:p15="http://schemas.microsoft.com/office/powerpoint/2012/main" xmlns:ahyp="http://schemas.microsoft.com/office/drawing/2018/hyperlinkcolor">
+  <p:cm authorId="0" idx="3" dt="2024-04-23T20:07:32.054">
+    <p:pos x="6000" y="0"/>
+    <p:text>@vrathor@asu.edu
+_Assigned to vrathor@asu.edu_</p:text>
+  </p:cm>
+</p:cmLst>
 </file>
 
 <file path=ppt/notesMasters/notesMaster1.xml><?xml version="1.0" encoding="utf-8"?>
@@ -994,7 +1040,7 @@
   <p:cSld>
     <p:spTree>
       <p:nvGrpSpPr>
-        <p:cNvPr id="68" name="Shape 68"/>
+        <p:cNvPr id="69" name="Shape 69"/>
         <p:cNvGrpSpPr/>
         <p:nvPr/>
       </p:nvGrpSpPr>
@@ -1008,7 +1054,7 @@
       </p:grpSpPr>
       <p:sp>
         <p:nvSpPr>
-          <p:cNvPr id="69" name="Google Shape;69;g2cec63ab867_0_0:notes"/>
+          <p:cNvPr id="70" name="Google Shape;70;g2cec63ab867_0_0:notes"/>
           <p:cNvSpPr/>
           <p:nvPr>
             <p:ph idx="2" type="sldImg"/>
@@ -1043,7 +1089,7 @@
       </p:sp>
       <p:sp>
         <p:nvSpPr>
-          <p:cNvPr id="70" name="Google Shape;70;g2cec63ab867_0_0:notes"/>
+          <p:cNvPr id="71" name="Google Shape;71;g2cec63ab867_0_0:notes"/>
           <p:cNvSpPr txBox="1"/>
           <p:nvPr>
             <p:ph idx="1" type="body"/>
@@ -1093,7 +1139,7 @@
   <p:cSld>
     <p:spTree>
       <p:nvGrpSpPr>
-        <p:cNvPr id="74" name="Shape 74"/>
+        <p:cNvPr id="75" name="Shape 75"/>
         <p:cNvGrpSpPr/>
         <p:nvPr/>
       </p:nvGrpSpPr>
@@ -1107,7 +1153,7 @@
       </p:grpSpPr>
       <p:sp>
         <p:nvSpPr>
-          <p:cNvPr id="75" name="Google Shape;75;g2cec63ab867_0_5:notes"/>
+          <p:cNvPr id="76" name="Google Shape;76;g2cec63ab867_0_5:notes"/>
           <p:cNvSpPr/>
           <p:nvPr>
             <p:ph idx="2" type="sldImg"/>
@@ -1142,7 +1188,7 @@
       </p:sp>
       <p:sp>
         <p:nvSpPr>
-          <p:cNvPr id="76" name="Google Shape;76;g2cec63ab867_0_5:notes"/>
+          <p:cNvPr id="77" name="Google Shape;77;g2cec63ab867_0_5:notes"/>
           <p:cNvSpPr txBox="1"/>
           <p:nvPr>
             <p:ph idx="1" type="body"/>
@@ -1192,7 +1238,7 @@
   <p:cSld>
     <p:spTree>
       <p:nvGrpSpPr>
-        <p:cNvPr id="80" name="Shape 80"/>
+        <p:cNvPr id="82" name="Shape 82"/>
         <p:cNvGrpSpPr/>
         <p:nvPr/>
       </p:nvGrpSpPr>
@@ -1206,7 +1252,7 @@
       </p:grpSpPr>
       <p:sp>
         <p:nvSpPr>
-          <p:cNvPr id="81" name="Google Shape;81;g2cec63ab867_0_10:notes"/>
+          <p:cNvPr id="83" name="Google Shape;83;g2cf1d518104_0_3:notes"/>
           <p:cNvSpPr/>
           <p:nvPr>
             <p:ph idx="2" type="sldImg"/>
@@ -1241,7 +1287,7 @@
       </p:sp>
       <p:sp>
         <p:nvSpPr>
-          <p:cNvPr id="82" name="Google Shape;82;g2cec63ab867_0_10:notes"/>
+          <p:cNvPr id="84" name="Google Shape;84;g2cf1d518104_0_3:notes"/>
           <p:cNvSpPr txBox="1"/>
           <p:nvPr>
             <p:ph idx="1" type="body"/>
@@ -1291,7 +1337,7 @@
   <p:cSld>
     <p:spTree>
       <p:nvGrpSpPr>
-        <p:cNvPr id="86" name="Shape 86"/>
+        <p:cNvPr id="88" name="Shape 88"/>
         <p:cNvGrpSpPr/>
         <p:nvPr/>
       </p:nvGrpSpPr>
@@ -1305,7 +1351,7 @@
       </p:grpSpPr>
       <p:sp>
         <p:nvSpPr>
-          <p:cNvPr id="87" name="Google Shape;87;g2cec63ab867_0_20:notes"/>
+          <p:cNvPr id="89" name="Google Shape;89;g2cec63ab867_0_10:notes"/>
           <p:cNvSpPr/>
           <p:nvPr>
             <p:ph idx="2" type="sldImg"/>
@@ -1340,7 +1386,106 @@
       </p:sp>
       <p:sp>
         <p:nvSpPr>
-          <p:cNvPr id="88" name="Google Shape;88;g2cec63ab867_0_20:notes"/>
+          <p:cNvPr id="90" name="Google Shape;90;g2cec63ab867_0_10:notes"/>
+          <p:cNvSpPr txBox="1"/>
+          <p:nvPr>
+            <p:ph idx="1" type="body"/>
+          </p:nvPr>
+        </p:nvSpPr>
+        <p:spPr>
+          <a:xfrm>
+            <a:off x="685800" y="4343400"/>
+            <a:ext cx="5486400" cy="4114800"/>
+          </a:xfrm>
+          <a:prstGeom prst="rect">
+            <a:avLst/>
+          </a:prstGeom>
+        </p:spPr>
+        <p:txBody>
+          <a:bodyPr anchorCtr="0" anchor="t" bIns="91425" lIns="91425" spcFirstLastPara="1" rIns="91425" wrap="square" tIns="91425">
+            <a:noAutofit/>
+          </a:bodyPr>
+          <a:lstStyle/>
+          <a:p>
+            <a:pPr indent="0" lvl="0" marL="0" rtl="0" algn="l">
+              <a:spcBef>
+                <a:spcPts val="0"/>
+              </a:spcBef>
+              <a:spcAft>
+                <a:spcPts val="0"/>
+              </a:spcAft>
+              <a:buNone/>
+            </a:pPr>
+            <a:r>
+              <a:t/>
+            </a:r>
+            <a:endParaRPr/>
+          </a:p>
+        </p:txBody>
+      </p:sp>
+    </p:spTree>
+  </p:cSld>
+  <p:clrMapOvr>
+    <a:masterClrMapping/>
+  </p:clrMapOvr>
+</p:notes>
+</file>
+
+<file path=ppt/notesSlides/notesSlide8.xml><?xml version="1.0" encoding="utf-8"?>
+<p:notes xmlns:a="http://schemas.openxmlformats.org/drawingml/2006/main" xmlns:r="http://schemas.openxmlformats.org/officeDocument/2006/relationships" xmlns:mc="http://schemas.openxmlformats.org/markup-compatibility/2006" xmlns:mv="urn:schemas-microsoft-com:mac:vml" xmlns:p="http://schemas.openxmlformats.org/presentationml/2006/main" xmlns:c="http://schemas.openxmlformats.org/drawingml/2006/chart" xmlns:dgm="http://schemas.openxmlformats.org/drawingml/2006/diagram" xmlns:o="urn:schemas-microsoft-com:office:office" xmlns:v="urn:schemas-microsoft-com:vml" xmlns:pvml="urn:schemas-microsoft-com:office:powerpoint" xmlns:com="http://schemas.openxmlformats.org/drawingml/2006/compatibility" xmlns:p14="http://schemas.microsoft.com/office/powerpoint/2010/main" xmlns:p15="http://schemas.microsoft.com/office/powerpoint/2012/main" xmlns:ahyp="http://schemas.microsoft.com/office/drawing/2018/hyperlinkcolor" showMasterPhAnim="0" showMasterSp="0">
+  <p:cSld>
+    <p:spTree>
+      <p:nvGrpSpPr>
+        <p:cNvPr id="95" name="Shape 95"/>
+        <p:cNvGrpSpPr/>
+        <p:nvPr/>
+      </p:nvGrpSpPr>
+      <p:grpSpPr>
+        <a:xfrm>
+          <a:off x="0" y="0"/>
+          <a:ext cx="0" cy="0"/>
+          <a:chOff x="0" y="0"/>
+          <a:chExt cx="0" cy="0"/>
+        </a:xfrm>
+      </p:grpSpPr>
+      <p:sp>
+        <p:nvSpPr>
+          <p:cNvPr id="96" name="Google Shape;96;g2cec63ab867_0_20:notes"/>
+          <p:cNvSpPr/>
+          <p:nvPr>
+            <p:ph idx="2" type="sldImg"/>
+          </p:nvPr>
+        </p:nvSpPr>
+        <p:spPr>
+          <a:xfrm>
+            <a:off x="381300" y="685800"/>
+            <a:ext cx="6096000" cy="3429000"/>
+          </a:xfrm>
+          <a:custGeom>
+            <a:rect b="b" l="l" r="r" t="t"/>
+            <a:pathLst>
+              <a:path extrusionOk="0" h="120000" w="120000">
+                <a:moveTo>
+                  <a:pt x="0" y="0"/>
+                </a:moveTo>
+                <a:lnTo>
+                  <a:pt x="120000" y="0"/>
+                </a:lnTo>
+                <a:lnTo>
+                  <a:pt x="120000" y="120000"/>
+                </a:lnTo>
+                <a:lnTo>
+                  <a:pt x="0" y="120000"/>
+                </a:lnTo>
+                <a:close/>
+              </a:path>
+            </a:pathLst>
+          </a:custGeom>
+        </p:spPr>
+      </p:sp>
+      <p:sp>
+        <p:nvSpPr>
+          <p:cNvPr id="97" name="Google Shape;97;g2cec63ab867_0_20:notes"/>
           <p:cNvSpPr txBox="1"/>
           <p:nvPr>
             <p:ph idx="1" type="body"/>
@@ -6311,7 +6456,7 @@
         <p:spPr>
           <a:xfrm>
             <a:off x="311700" y="1152475"/>
-            <a:ext cx="8520600" cy="3416400"/>
+            <a:ext cx="3801000" cy="3416400"/>
           </a:xfrm>
           <a:prstGeom prst="rect">
             <a:avLst/>
@@ -6328,12 +6473,794 @@
                 <a:spcPts val="0"/>
               </a:spcBef>
               <a:spcAft>
+                <a:spcPts val="0"/>
+              </a:spcAft>
+              <a:buClr>
+                <a:schemeClr val="dk1"/>
+              </a:buClr>
+              <a:buSzPts val="1100"/>
+              <a:buFont typeface="Arial"/>
+              <a:buNone/>
+            </a:pPr>
+            <a:r>
+              <a:rPr lang="en" sz="1100">
+                <a:solidFill>
+                  <a:schemeClr val="dk1"/>
+                </a:solidFill>
+              </a:rPr>
+              <a:t>P in Program</a:t>
+            </a:r>
+            <a:endParaRPr sz="1100">
+              <a:solidFill>
+                <a:schemeClr val="dk1"/>
+              </a:solidFill>
+            </a:endParaRPr>
+          </a:p>
+          <a:p>
+            <a:pPr indent="0" lvl="0" marL="0" rtl="0" algn="l">
+              <a:spcBef>
+                <a:spcPts val="0"/>
+              </a:spcBef>
+              <a:spcAft>
+                <a:spcPts val="0"/>
+              </a:spcAft>
+              <a:buClr>
+                <a:schemeClr val="dk1"/>
+              </a:buClr>
+              <a:buSzPts val="1100"/>
+              <a:buFont typeface="Arial"/>
+              <a:buNone/>
+            </a:pPr>
+            <a:r>
+              <a:rPr lang="en" sz="1100">
+                <a:solidFill>
+                  <a:schemeClr val="dk1"/>
+                </a:solidFill>
+              </a:rPr>
+              <a:t>K in Block</a:t>
+            </a:r>
+            <a:endParaRPr sz="1100">
+              <a:solidFill>
+                <a:schemeClr val="dk1"/>
+              </a:solidFill>
+            </a:endParaRPr>
+          </a:p>
+          <a:p>
+            <a:pPr indent="0" lvl="0" marL="0" rtl="0" algn="l">
+              <a:spcBef>
+                <a:spcPts val="0"/>
+              </a:spcBef>
+              <a:spcAft>
+                <a:spcPts val="0"/>
+              </a:spcAft>
+              <a:buClr>
+                <a:schemeClr val="dk1"/>
+              </a:buClr>
+              <a:buSzPts val="1100"/>
+              <a:buFont typeface="Arial"/>
+              <a:buNone/>
+            </a:pPr>
+            <a:r>
+              <a:rPr lang="en" sz="1100">
+                <a:solidFill>
+                  <a:schemeClr val="dk1"/>
+                </a:solidFill>
+              </a:rPr>
+              <a:t>C in Command</a:t>
+            </a:r>
+            <a:endParaRPr sz="1100">
+              <a:solidFill>
+                <a:schemeClr val="dk1"/>
+              </a:solidFill>
+            </a:endParaRPr>
+          </a:p>
+          <a:p>
+            <a:pPr indent="0" lvl="0" marL="0" rtl="0" algn="l">
+              <a:spcBef>
+                <a:spcPts val="0"/>
+              </a:spcBef>
+              <a:spcAft>
+                <a:spcPts val="0"/>
+              </a:spcAft>
+              <a:buClr>
+                <a:schemeClr val="dk1"/>
+              </a:buClr>
+              <a:buSzPts val="1100"/>
+              <a:buFont typeface="Arial"/>
+              <a:buNone/>
+            </a:pPr>
+            <a:r>
+              <a:rPr lang="en" sz="1100">
+                <a:solidFill>
+                  <a:schemeClr val="dk1"/>
+                </a:solidFill>
+              </a:rPr>
+              <a:t>B in Boolean Expression</a:t>
+            </a:r>
+            <a:endParaRPr sz="1100">
+              <a:solidFill>
+                <a:schemeClr val="dk1"/>
+              </a:solidFill>
+            </a:endParaRPr>
+          </a:p>
+          <a:p>
+            <a:pPr indent="0" lvl="0" marL="0" rtl="0" algn="l">
+              <a:spcBef>
+                <a:spcPts val="0"/>
+              </a:spcBef>
+              <a:spcAft>
+                <a:spcPts val="0"/>
+              </a:spcAft>
+              <a:buClr>
+                <a:schemeClr val="dk1"/>
+              </a:buClr>
+              <a:buSzPts val="1100"/>
+              <a:buFont typeface="Arial"/>
+              <a:buNone/>
+            </a:pPr>
+            <a:r>
+              <a:rPr lang="en" sz="1100">
+                <a:solidFill>
+                  <a:schemeClr val="dk1"/>
+                </a:solidFill>
+              </a:rPr>
+              <a:t>E in Arithmetic Expression</a:t>
+            </a:r>
+            <a:endParaRPr sz="1100">
+              <a:solidFill>
+                <a:schemeClr val="dk1"/>
+              </a:solidFill>
+            </a:endParaRPr>
+          </a:p>
+          <a:p>
+            <a:pPr indent="0" lvl="0" marL="0" rtl="0" algn="l">
+              <a:spcBef>
+                <a:spcPts val="0"/>
+              </a:spcBef>
+              <a:spcAft>
+                <a:spcPts val="0"/>
+              </a:spcAft>
+              <a:buClr>
+                <a:schemeClr val="dk1"/>
+              </a:buClr>
+              <a:buSzPts val="1100"/>
+              <a:buFont typeface="Arial"/>
+              <a:buNone/>
+            </a:pPr>
+            <a:r>
+              <a:rPr lang="en" sz="1100">
+                <a:solidFill>
+                  <a:schemeClr val="dk1"/>
+                </a:solidFill>
+              </a:rPr>
+              <a:t>S in String Expression</a:t>
+            </a:r>
+            <a:endParaRPr sz="1100">
+              <a:solidFill>
+                <a:schemeClr val="dk1"/>
+              </a:solidFill>
+            </a:endParaRPr>
+          </a:p>
+          <a:p>
+            <a:pPr indent="0" lvl="0" marL="0" rtl="0" algn="l">
+              <a:spcBef>
+                <a:spcPts val="0"/>
+              </a:spcBef>
+              <a:spcAft>
+                <a:spcPts val="0"/>
+              </a:spcAft>
+              <a:buClr>
+                <a:schemeClr val="dk1"/>
+              </a:buClr>
+              <a:buSzPts val="1100"/>
+              <a:buFont typeface="Arial"/>
+              <a:buNone/>
+            </a:pPr>
+            <a:r>
+              <a:rPr lang="en" sz="1100">
+                <a:solidFill>
+                  <a:schemeClr val="dk1"/>
+                </a:solidFill>
+              </a:rPr>
+              <a:t>I in Identifier</a:t>
+            </a:r>
+            <a:endParaRPr sz="1100">
+              <a:solidFill>
+                <a:schemeClr val="dk1"/>
+              </a:solidFill>
+            </a:endParaRPr>
+          </a:p>
+          <a:p>
+            <a:pPr indent="0" lvl="0" marL="0" rtl="0" algn="l">
+              <a:spcBef>
+                <a:spcPts val="0"/>
+              </a:spcBef>
+              <a:spcAft>
+                <a:spcPts val="0"/>
+              </a:spcAft>
+              <a:buClr>
+                <a:schemeClr val="dk1"/>
+              </a:buClr>
+              <a:buSzPts val="1100"/>
+              <a:buFont typeface="Arial"/>
+              <a:buNone/>
+            </a:pPr>
+            <a:r>
+              <a:rPr lang="en" sz="1100">
+                <a:solidFill>
+                  <a:schemeClr val="dk1"/>
+                </a:solidFill>
+              </a:rPr>
+              <a:t>N in Number</a:t>
+            </a:r>
+            <a:endParaRPr sz="1100">
+              <a:solidFill>
+                <a:schemeClr val="dk1"/>
+              </a:solidFill>
+            </a:endParaRPr>
+          </a:p>
+          <a:p>
+            <a:pPr indent="0" lvl="0" marL="0" rtl="0" algn="l">
+              <a:spcBef>
+                <a:spcPts val="0"/>
+              </a:spcBef>
+              <a:spcAft>
+                <a:spcPts val="0"/>
+              </a:spcAft>
+              <a:buClr>
+                <a:schemeClr val="dk1"/>
+              </a:buClr>
+              <a:buSzPts val="1100"/>
+              <a:buFont typeface="Arial"/>
+              <a:buNone/>
+            </a:pPr>
+            <a:r>
+              <a:rPr lang="en" sz="1100">
+                <a:solidFill>
+                  <a:schemeClr val="dk1"/>
+                </a:solidFill>
+              </a:rPr>
+              <a:t>Str in String</a:t>
+            </a:r>
+            <a:endParaRPr sz="1100">
+              <a:solidFill>
+                <a:schemeClr val="dk1"/>
+              </a:solidFill>
+            </a:endParaRPr>
+          </a:p>
+          <a:p>
+            <a:pPr indent="0" lvl="0" marL="0" rtl="0" algn="l">
+              <a:spcBef>
+                <a:spcPts val="0"/>
+              </a:spcBef>
+              <a:spcAft>
                 <a:spcPts val="1200"/>
               </a:spcAft>
               <a:buNone/>
             </a:pPr>
             <a:r>
               <a:t/>
+            </a:r>
+            <a:endParaRPr/>
+          </a:p>
+        </p:txBody>
+      </p:sp>
+      <p:sp>
+        <p:nvSpPr>
+          <p:cNvPr id="68" name="Google Shape;68;p15"/>
+          <p:cNvSpPr txBox="1"/>
+          <p:nvPr>
+            <p:ph idx="1" type="body"/>
+          </p:nvPr>
+        </p:nvSpPr>
+        <p:spPr>
+          <a:xfrm>
+            <a:off x="4112700" y="1152475"/>
+            <a:ext cx="4260300" cy="3416400"/>
+          </a:xfrm>
+          <a:prstGeom prst="rect">
+            <a:avLst/>
+          </a:prstGeom>
+        </p:spPr>
+        <p:txBody>
+          <a:bodyPr anchorCtr="0" anchor="t" bIns="91425" lIns="91425" spcFirstLastPara="1" rIns="91425" wrap="square" tIns="91425">
+            <a:normAutofit fontScale="40000" lnSpcReduction="10000"/>
+          </a:bodyPr>
+          <a:lstStyle/>
+          <a:p>
+            <a:pPr indent="0" lvl="0" marL="0" rtl="0" algn="l">
+              <a:spcBef>
+                <a:spcPts val="0"/>
+              </a:spcBef>
+              <a:spcAft>
+                <a:spcPts val="0"/>
+              </a:spcAft>
+              <a:buNone/>
+            </a:pPr>
+            <a:r>
+              <a:rPr lang="en" sz="2300">
+                <a:solidFill>
+                  <a:schemeClr val="dk1"/>
+                </a:solidFill>
+              </a:rPr>
+              <a:t>P → K.</a:t>
+            </a:r>
+            <a:endParaRPr sz="2300">
+              <a:solidFill>
+                <a:schemeClr val="dk1"/>
+              </a:solidFill>
+            </a:endParaRPr>
+          </a:p>
+          <a:p>
+            <a:pPr indent="0" lvl="0" marL="0" rtl="0" algn="l">
+              <a:spcBef>
+                <a:spcPts val="0"/>
+              </a:spcBef>
+              <a:spcAft>
+                <a:spcPts val="0"/>
+              </a:spcAft>
+              <a:buNone/>
+            </a:pPr>
+            <a:r>
+              <a:rPr lang="en" sz="2300">
+                <a:solidFill>
+                  <a:schemeClr val="dk1"/>
+                </a:solidFill>
+              </a:rPr>
+              <a:t>K → begin C end</a:t>
+            </a:r>
+            <a:endParaRPr sz="2300">
+              <a:solidFill>
+                <a:schemeClr val="dk1"/>
+              </a:solidFill>
+            </a:endParaRPr>
+          </a:p>
+          <a:p>
+            <a:pPr indent="0" lvl="0" marL="0" rtl="0" algn="l">
+              <a:spcBef>
+                <a:spcPts val="0"/>
+              </a:spcBef>
+              <a:spcAft>
+                <a:spcPts val="0"/>
+              </a:spcAft>
+              <a:buNone/>
+            </a:pPr>
+            <a:r>
+              <a:t/>
+            </a:r>
+            <a:endParaRPr sz="2300">
+              <a:solidFill>
+                <a:schemeClr val="dk1"/>
+              </a:solidFill>
+            </a:endParaRPr>
+          </a:p>
+          <a:p>
+            <a:pPr indent="0" lvl="0" marL="0" rtl="0" algn="l">
+              <a:spcBef>
+                <a:spcPts val="0"/>
+              </a:spcBef>
+              <a:spcAft>
+                <a:spcPts val="0"/>
+              </a:spcAft>
+              <a:buNone/>
+            </a:pPr>
+            <a:r>
+              <a:rPr lang="en" sz="2300">
+                <a:solidFill>
+                  <a:schemeClr val="dk1"/>
+                </a:solidFill>
+              </a:rPr>
+              <a:t>C → C; C</a:t>
+            </a:r>
+            <a:endParaRPr sz="2300">
+              <a:solidFill>
+                <a:schemeClr val="dk1"/>
+              </a:solidFill>
+            </a:endParaRPr>
+          </a:p>
+          <a:p>
+            <a:pPr indent="0" lvl="0" marL="0" rtl="0" algn="l">
+              <a:spcBef>
+                <a:spcPts val="0"/>
+              </a:spcBef>
+              <a:spcAft>
+                <a:spcPts val="0"/>
+              </a:spcAft>
+              <a:buNone/>
+            </a:pPr>
+            <a:r>
+              <a:rPr lang="en" sz="2300">
+                <a:solidFill>
+                  <a:schemeClr val="dk1"/>
+                </a:solidFill>
+              </a:rPr>
+              <a:t>C → I := E | I := B | I := S</a:t>
+            </a:r>
+            <a:endParaRPr sz="2300">
+              <a:solidFill>
+                <a:schemeClr val="dk1"/>
+              </a:solidFill>
+            </a:endParaRPr>
+          </a:p>
+          <a:p>
+            <a:pPr indent="0" lvl="0" marL="0" rtl="0" algn="l">
+              <a:spcBef>
+                <a:spcPts val="0"/>
+              </a:spcBef>
+              <a:spcAft>
+                <a:spcPts val="0"/>
+              </a:spcAft>
+              <a:buNone/>
+            </a:pPr>
+            <a:r>
+              <a:rPr lang="en" sz="2300">
+                <a:solidFill>
+                  <a:schemeClr val="dk1"/>
+                </a:solidFill>
+              </a:rPr>
+              <a:t>C → if B then C else C endif | B ? C : C endtern | while B do C endwhile | </a:t>
+            </a:r>
+            <a:endParaRPr sz="2300">
+              <a:solidFill>
+                <a:schemeClr val="dk1"/>
+              </a:solidFill>
+            </a:endParaRPr>
+          </a:p>
+          <a:p>
+            <a:pPr indent="0" lvl="0" marL="0" rtl="0" algn="l">
+              <a:spcBef>
+                <a:spcPts val="0"/>
+              </a:spcBef>
+              <a:spcAft>
+                <a:spcPts val="0"/>
+              </a:spcAft>
+              <a:buNone/>
+            </a:pPr>
+            <a:r>
+              <a:rPr lang="en" sz="2300">
+                <a:solidFill>
+                  <a:schemeClr val="dk1"/>
+                </a:solidFill>
+              </a:rPr>
+              <a:t>for C; B; C do C endfor | for C in range(N, N) do C endfor</a:t>
+            </a:r>
+            <a:endParaRPr sz="2300">
+              <a:solidFill>
+                <a:schemeClr val="dk1"/>
+              </a:solidFill>
+            </a:endParaRPr>
+          </a:p>
+          <a:p>
+            <a:pPr indent="0" lvl="0" marL="0" rtl="0" algn="l">
+              <a:spcBef>
+                <a:spcPts val="0"/>
+              </a:spcBef>
+              <a:spcAft>
+                <a:spcPts val="0"/>
+              </a:spcAft>
+              <a:buNone/>
+            </a:pPr>
+            <a:r>
+              <a:t/>
+            </a:r>
+            <a:endParaRPr sz="2300">
+              <a:solidFill>
+                <a:schemeClr val="dk1"/>
+              </a:solidFill>
+            </a:endParaRPr>
+          </a:p>
+          <a:p>
+            <a:pPr indent="0" lvl="0" marL="0" rtl="0" algn="l">
+              <a:spcBef>
+                <a:spcPts val="0"/>
+              </a:spcBef>
+              <a:spcAft>
+                <a:spcPts val="0"/>
+              </a:spcAft>
+              <a:buNone/>
+            </a:pPr>
+            <a:r>
+              <a:rPr lang="en" sz="2300">
+                <a:solidFill>
+                  <a:schemeClr val="dk1"/>
+                </a:solidFill>
+              </a:rPr>
+              <a:t>C → print(I) | </a:t>
+            </a:r>
+            <a:r>
+              <a:rPr lang="en" sz="2300">
+                <a:solidFill>
+                  <a:schemeClr val="dk1"/>
+                </a:solidFill>
+              </a:rPr>
+              <a:t>print(N) | print(Str)</a:t>
+            </a:r>
+            <a:endParaRPr sz="2300">
+              <a:solidFill>
+                <a:schemeClr val="dk1"/>
+              </a:solidFill>
+            </a:endParaRPr>
+          </a:p>
+          <a:p>
+            <a:pPr indent="0" lvl="0" marL="0" rtl="0" algn="l">
+              <a:spcBef>
+                <a:spcPts val="0"/>
+              </a:spcBef>
+              <a:spcAft>
+                <a:spcPts val="0"/>
+              </a:spcAft>
+              <a:buNone/>
+            </a:pPr>
+            <a:r>
+              <a:t/>
+            </a:r>
+            <a:endParaRPr sz="2300">
+              <a:solidFill>
+                <a:schemeClr val="dk1"/>
+              </a:solidFill>
+            </a:endParaRPr>
+          </a:p>
+          <a:p>
+            <a:pPr indent="0" lvl="0" marL="0" rtl="0" algn="l">
+              <a:spcBef>
+                <a:spcPts val="0"/>
+              </a:spcBef>
+              <a:spcAft>
+                <a:spcPts val="0"/>
+              </a:spcAft>
+              <a:buNone/>
+            </a:pPr>
+            <a:r>
+              <a:rPr lang="en" sz="2300">
+                <a:solidFill>
+                  <a:schemeClr val="dk1"/>
+                </a:solidFill>
+              </a:rPr>
+              <a:t>B → true | false | E = E | B = B | S = S | not B | B and B | B or B | I</a:t>
+            </a:r>
+            <a:endParaRPr sz="2300">
+              <a:solidFill>
+                <a:schemeClr val="dk1"/>
+              </a:solidFill>
+            </a:endParaRPr>
+          </a:p>
+          <a:p>
+            <a:pPr indent="0" lvl="0" marL="0" rtl="0" algn="l">
+              <a:spcBef>
+                <a:spcPts val="0"/>
+              </a:spcBef>
+              <a:spcAft>
+                <a:spcPts val="0"/>
+              </a:spcAft>
+              <a:buNone/>
+            </a:pPr>
+            <a:r>
+              <a:t/>
+            </a:r>
+            <a:endParaRPr sz="2300">
+              <a:solidFill>
+                <a:schemeClr val="dk1"/>
+              </a:solidFill>
+            </a:endParaRPr>
+          </a:p>
+          <a:p>
+            <a:pPr indent="0" lvl="0" marL="0" rtl="0" algn="l">
+              <a:spcBef>
+                <a:spcPts val="0"/>
+              </a:spcBef>
+              <a:spcAft>
+                <a:spcPts val="0"/>
+              </a:spcAft>
+              <a:buNone/>
+            </a:pPr>
+            <a:r>
+              <a:rPr lang="en" sz="2300">
+                <a:solidFill>
+                  <a:schemeClr val="dk1"/>
+                </a:solidFill>
+              </a:rPr>
+              <a:t>E → E + E | E - E | E * E | E / E | ( E ) | I | N</a:t>
+            </a:r>
+            <a:endParaRPr sz="2300">
+              <a:solidFill>
+                <a:schemeClr val="dk1"/>
+              </a:solidFill>
+            </a:endParaRPr>
+          </a:p>
+          <a:p>
+            <a:pPr indent="0" lvl="0" marL="0" rtl="0" algn="l">
+              <a:spcBef>
+                <a:spcPts val="0"/>
+              </a:spcBef>
+              <a:spcAft>
+                <a:spcPts val="0"/>
+              </a:spcAft>
+              <a:buNone/>
+            </a:pPr>
+            <a:r>
+              <a:t/>
+            </a:r>
+            <a:endParaRPr sz="2300">
+              <a:solidFill>
+                <a:schemeClr val="dk1"/>
+              </a:solidFill>
+            </a:endParaRPr>
+          </a:p>
+          <a:p>
+            <a:pPr indent="0" lvl="0" marL="0" rtl="0" algn="l">
+              <a:spcBef>
+                <a:spcPts val="0"/>
+              </a:spcBef>
+              <a:spcAft>
+                <a:spcPts val="0"/>
+              </a:spcAft>
+              <a:buNone/>
+            </a:pPr>
+            <a:r>
+              <a:rPr lang="en" sz="2300">
+                <a:solidFill>
+                  <a:schemeClr val="dk1"/>
+                </a:solidFill>
+              </a:rPr>
+              <a:t>I → Char {Char}</a:t>
+            </a:r>
+            <a:endParaRPr sz="2300">
+              <a:solidFill>
+                <a:schemeClr val="dk1"/>
+              </a:solidFill>
+            </a:endParaRPr>
+          </a:p>
+          <a:p>
+            <a:pPr indent="0" lvl="0" marL="0" rtl="0" algn="l">
+              <a:spcBef>
+                <a:spcPts val="0"/>
+              </a:spcBef>
+              <a:spcAft>
+                <a:spcPts val="0"/>
+              </a:spcAft>
+              <a:buNone/>
+            </a:pPr>
+            <a:r>
+              <a:t/>
+            </a:r>
+            <a:endParaRPr sz="2300">
+              <a:solidFill>
+                <a:schemeClr val="dk1"/>
+              </a:solidFill>
+            </a:endParaRPr>
+          </a:p>
+          <a:p>
+            <a:pPr indent="0" lvl="0" marL="0" rtl="0" algn="l">
+              <a:spcBef>
+                <a:spcPts val="0"/>
+              </a:spcBef>
+              <a:spcAft>
+                <a:spcPts val="0"/>
+              </a:spcAft>
+              <a:buNone/>
+            </a:pPr>
+            <a:r>
+              <a:rPr lang="en" sz="2300">
+                <a:solidFill>
+                  <a:schemeClr val="dk1"/>
+                </a:solidFill>
+              </a:rPr>
+              <a:t>N → Dig {Dig}</a:t>
+            </a:r>
+            <a:endParaRPr sz="2300">
+              <a:solidFill>
+                <a:schemeClr val="dk1"/>
+              </a:solidFill>
+            </a:endParaRPr>
+          </a:p>
+          <a:p>
+            <a:pPr indent="0" lvl="0" marL="0" rtl="0" algn="l">
+              <a:spcBef>
+                <a:spcPts val="0"/>
+              </a:spcBef>
+              <a:spcAft>
+                <a:spcPts val="0"/>
+              </a:spcAft>
+              <a:buNone/>
+            </a:pPr>
+            <a:r>
+              <a:rPr lang="en" sz="2300">
+                <a:solidFill>
+                  <a:schemeClr val="dk1"/>
+                </a:solidFill>
+              </a:rPr>
+              <a:t>Dig → 0 | 1 | 2 | 3 | 4 | 5 | 6 | 7 | 8 | 9</a:t>
+            </a:r>
+            <a:endParaRPr sz="2300">
+              <a:solidFill>
+                <a:schemeClr val="dk1"/>
+              </a:solidFill>
+            </a:endParaRPr>
+          </a:p>
+          <a:p>
+            <a:pPr indent="0" lvl="0" marL="0" rtl="0" algn="l">
+              <a:spcBef>
+                <a:spcPts val="0"/>
+              </a:spcBef>
+              <a:spcAft>
+                <a:spcPts val="0"/>
+              </a:spcAft>
+              <a:buNone/>
+            </a:pPr>
+            <a:r>
+              <a:t/>
+            </a:r>
+            <a:endParaRPr sz="2300">
+              <a:solidFill>
+                <a:schemeClr val="dk1"/>
+              </a:solidFill>
+            </a:endParaRPr>
+          </a:p>
+          <a:p>
+            <a:pPr indent="0" lvl="0" marL="0" rtl="0" algn="l">
+              <a:spcBef>
+                <a:spcPts val="0"/>
+              </a:spcBef>
+              <a:spcAft>
+                <a:spcPts val="0"/>
+              </a:spcAft>
+              <a:buNone/>
+            </a:pPr>
+            <a:r>
+              <a:rPr lang="en" sz="2300">
+                <a:solidFill>
+                  <a:schemeClr val="dk1"/>
+                </a:solidFill>
+              </a:rPr>
+              <a:t>S → Str | I</a:t>
+            </a:r>
+            <a:endParaRPr sz="2300">
+              <a:solidFill>
+                <a:schemeClr val="dk1"/>
+              </a:solidFill>
+            </a:endParaRPr>
+          </a:p>
+          <a:p>
+            <a:pPr indent="0" lvl="0" marL="0" rtl="0" algn="l">
+              <a:spcBef>
+                <a:spcPts val="0"/>
+              </a:spcBef>
+              <a:spcAft>
+                <a:spcPts val="0"/>
+              </a:spcAft>
+              <a:buNone/>
+            </a:pPr>
+            <a:r>
+              <a:rPr lang="en" sz="2300">
+                <a:solidFill>
+                  <a:schemeClr val="dk1"/>
+                </a:solidFill>
+              </a:rPr>
+              <a:t>Str → “ Char {Char} “</a:t>
+            </a:r>
+            <a:endParaRPr sz="2300">
+              <a:solidFill>
+                <a:schemeClr val="dk1"/>
+              </a:solidFill>
+            </a:endParaRPr>
+          </a:p>
+          <a:p>
+            <a:pPr indent="0" lvl="0" marL="0" rtl="0" algn="l">
+              <a:spcBef>
+                <a:spcPts val="0"/>
+              </a:spcBef>
+              <a:spcAft>
+                <a:spcPts val="0"/>
+              </a:spcAft>
+              <a:buNone/>
+            </a:pPr>
+            <a:r>
+              <a:rPr lang="en" sz="2300">
+                <a:solidFill>
+                  <a:schemeClr val="dk1"/>
+                </a:solidFill>
+              </a:rPr>
+              <a:t>Char → a | b | c | … | x | y | z</a:t>
             </a:r>
             <a:endParaRPr/>
           </a:p>
@@ -6352,7 +7279,7 @@
   <p:cSld>
     <p:spTree>
       <p:nvGrpSpPr>
-        <p:cNvPr id="71" name="Shape 71"/>
+        <p:cNvPr id="72" name="Shape 72"/>
         <p:cNvGrpSpPr/>
         <p:nvPr/>
       </p:nvGrpSpPr>
@@ -6366,7 +7293,7 @@
       </p:grpSpPr>
       <p:sp>
         <p:nvSpPr>
-          <p:cNvPr id="72" name="Google Shape;72;p16"/>
+          <p:cNvPr id="73" name="Google Shape;73;p16"/>
           <p:cNvSpPr txBox="1"/>
           <p:nvPr>
             <p:ph type="title"/>
@@ -6406,7 +7333,7 @@
       </p:sp>
       <p:sp>
         <p:nvSpPr>
-          <p:cNvPr id="73" name="Google Shape;73;p16"/>
+          <p:cNvPr id="74" name="Google Shape;74;p16"/>
           <p:cNvSpPr txBox="1"/>
           <p:nvPr>
             <p:ph idx="1" type="body"/>
@@ -6456,7 +7383,7 @@
   <p:cSld>
     <p:spTree>
       <p:nvGrpSpPr>
-        <p:cNvPr id="77" name="Shape 77"/>
+        <p:cNvPr id="78" name="Shape 78"/>
         <p:cNvGrpSpPr/>
         <p:nvPr/>
       </p:nvGrpSpPr>
@@ -6470,7 +7397,7 @@
       </p:grpSpPr>
       <p:sp>
         <p:nvSpPr>
-          <p:cNvPr id="78" name="Google Shape;78;p17"/>
+          <p:cNvPr id="79" name="Google Shape;79;p17"/>
           <p:cNvSpPr txBox="1"/>
           <p:nvPr>
             <p:ph type="title"/>
@@ -6502,7 +7429,15 @@
             </a:pPr>
             <a:r>
               <a:rPr lang="en"/>
-              <a:t>Parser &amp; Intermediate Form</a:t>
+              <a:t>Parser &amp; </a:t>
+            </a:r>
+            <a:r>
+              <a:rPr lang="en"/>
+              <a:t>Intermediate</a:t>
+            </a:r>
+            <a:r>
+              <a:rPr lang="en"/>
+              <a:t> Form</a:t>
             </a:r>
             <a:endParaRPr/>
           </a:p>
@@ -6510,7 +7445,7 @@
       </p:sp>
       <p:sp>
         <p:nvSpPr>
-          <p:cNvPr id="79" name="Google Shape;79;p17"/>
+          <p:cNvPr id="80" name="Google Shape;80;p17"/>
           <p:cNvSpPr txBox="1"/>
           <p:nvPr>
             <p:ph idx="1" type="body"/>
@@ -6519,7 +7454,7 @@
         <p:spPr>
           <a:xfrm>
             <a:off x="311700" y="1152475"/>
-            <a:ext cx="8520600" cy="3416400"/>
+            <a:ext cx="8520600" cy="1419300"/>
           </a:xfrm>
           <a:prstGeom prst="rect">
             <a:avLst/>
@@ -6527,7 +7462,7 @@
         </p:spPr>
         <p:txBody>
           <a:bodyPr anchorCtr="0" anchor="t" bIns="91425" lIns="91425" spcFirstLastPara="1" rIns="91425" wrap="square" tIns="91425">
-            <a:normAutofit/>
+            <a:normAutofit lnSpcReduction="10000"/>
           </a:bodyPr>
           <a:lstStyle/>
           <a:p>
@@ -6536,17 +7471,157 @@
                 <a:spcPts val="0"/>
               </a:spcBef>
               <a:spcAft>
-                <a:spcPts val="1200"/>
+                <a:spcPts val="0"/>
+              </a:spcAft>
+              <a:buNone/>
+            </a:pPr>
+            <a:r>
+              <a:rPr lang="en" sz="1100">
+                <a:solidFill>
+                  <a:schemeClr val="dk1"/>
+                </a:solidFill>
+              </a:rPr>
+              <a:t>The Parser is implemented in Prolog using Definite Clause Grammar (DCG). It converts the token list from the Lexical Analyzer into a parse tree as the intermediate form. </a:t>
+            </a:r>
+            <a:endParaRPr sz="1100">
+              <a:solidFill>
+                <a:schemeClr val="dk1"/>
+              </a:solidFill>
+            </a:endParaRPr>
+          </a:p>
+          <a:p>
+            <a:pPr indent="0" lvl="0" marL="0" rtl="0" algn="l">
+              <a:spcBef>
+                <a:spcPts val="0"/>
+              </a:spcBef>
+              <a:spcAft>
+                <a:spcPts val="0"/>
               </a:spcAft>
               <a:buNone/>
             </a:pPr>
             <a:r>
               <a:t/>
             </a:r>
-            <a:endParaRPr/>
+            <a:endParaRPr sz="1100">
+              <a:solidFill>
+                <a:schemeClr val="dk1"/>
+              </a:solidFill>
+            </a:endParaRPr>
+          </a:p>
+          <a:p>
+            <a:pPr indent="0" lvl="0" marL="0" rtl="0" algn="l">
+              <a:spcBef>
+                <a:spcPts val="0"/>
+              </a:spcBef>
+              <a:spcAft>
+                <a:spcPts val="0"/>
+              </a:spcAft>
+              <a:buNone/>
+            </a:pPr>
+            <a:r>
+              <a:rPr lang="en" sz="1100">
+                <a:solidFill>
+                  <a:schemeClr val="dk1"/>
+                </a:solidFill>
+              </a:rPr>
+              <a:t>To invoke the Parser only, the following command can be used in a Prolog interpreter, where T is the resulting parse tree and Tokens is the token list: </a:t>
+            </a:r>
+            <a:r>
+              <a:rPr lang="en" sz="1100">
+                <a:solidFill>
+                  <a:schemeClr val="dk1"/>
+                </a:solidFill>
+                <a:latin typeface="Roboto Mono"/>
+                <a:ea typeface="Roboto Mono"/>
+                <a:cs typeface="Roboto Mono"/>
+                <a:sym typeface="Roboto Mono"/>
+              </a:rPr>
+              <a:t>program(T, Tokens, []).</a:t>
+            </a:r>
+            <a:endParaRPr sz="1100">
+              <a:solidFill>
+                <a:schemeClr val="dk1"/>
+              </a:solidFill>
+            </a:endParaRPr>
+          </a:p>
+          <a:p>
+            <a:pPr indent="0" lvl="0" marL="0" rtl="0" algn="l">
+              <a:spcBef>
+                <a:spcPts val="0"/>
+              </a:spcBef>
+              <a:spcAft>
+                <a:spcPts val="0"/>
+              </a:spcAft>
+              <a:buNone/>
+            </a:pPr>
+            <a:r>
+              <a:t/>
+            </a:r>
+            <a:endParaRPr sz="1100">
+              <a:solidFill>
+                <a:schemeClr val="dk1"/>
+              </a:solidFill>
+            </a:endParaRPr>
+          </a:p>
+          <a:p>
+            <a:pPr indent="0" lvl="0" marL="0" rtl="0" algn="l">
+              <a:spcBef>
+                <a:spcPts val="0"/>
+              </a:spcBef>
+              <a:spcAft>
+                <a:spcPts val="0"/>
+              </a:spcAft>
+              <a:buClr>
+                <a:schemeClr val="dk1"/>
+              </a:buClr>
+              <a:buSzPts val="1100"/>
+              <a:buFont typeface="Arial"/>
+              <a:buNone/>
+            </a:pPr>
+            <a:r>
+              <a:rPr lang="en" sz="1100">
+                <a:solidFill>
+                  <a:schemeClr val="dk1"/>
+                </a:solidFill>
+              </a:rPr>
+              <a:t>A sample usage is shown below:</a:t>
+            </a:r>
+            <a:endParaRPr sz="1100">
+              <a:solidFill>
+                <a:schemeClr val="dk1"/>
+              </a:solidFill>
+            </a:endParaRPr>
           </a:p>
         </p:txBody>
       </p:sp>
+      <p:pic>
+        <p:nvPicPr>
+          <p:cNvPr id="81" name="Google Shape;81;p17"/>
+          <p:cNvPicPr preferRelativeResize="0"/>
+          <p:nvPr/>
+        </p:nvPicPr>
+        <p:blipFill>
+          <a:blip r:embed="rId3">
+            <a:alphaModFix/>
+          </a:blip>
+          <a:stretch>
+            <a:fillRect/>
+          </a:stretch>
+        </p:blipFill>
+        <p:spPr>
+          <a:xfrm>
+            <a:off x="152400" y="2839700"/>
+            <a:ext cx="8839201" cy="1433663"/>
+          </a:xfrm>
+          <a:prstGeom prst="rect">
+            <a:avLst/>
+          </a:prstGeom>
+          <a:noFill/>
+          <a:ln>
+            <a:noFill/>
+          </a:ln>
+        </p:spPr>
+      </p:pic>
     </p:spTree>
   </p:cSld>
   <p:clrMapOvr>
@@ -6560,7 +7635,7 @@
   <p:cSld>
     <p:spTree>
       <p:nvGrpSpPr>
-        <p:cNvPr id="83" name="Shape 83"/>
+        <p:cNvPr id="85" name="Shape 85"/>
         <p:cNvGrpSpPr/>
         <p:nvPr/>
       </p:nvGrpSpPr>
@@ -6574,7 +7649,7 @@
       </p:grpSpPr>
       <p:sp>
         <p:nvSpPr>
-          <p:cNvPr id="84" name="Google Shape;84;p18"/>
+          <p:cNvPr id="86" name="Google Shape;86;p18"/>
           <p:cNvSpPr txBox="1"/>
           <p:nvPr>
             <p:ph type="title"/>
@@ -6602,11 +7677,16 @@
               <a:spcAft>
                 <a:spcPts val="0"/>
               </a:spcAft>
+              <a:buClr>
+                <a:schemeClr val="dk1"/>
+              </a:buClr>
+              <a:buSzPct val="39285"/>
+              <a:buFont typeface="Arial"/>
               <a:buNone/>
             </a:pPr>
             <a:r>
               <a:rPr lang="en"/>
-              <a:t>Interpreter</a:t>
+              <a:t>Parser &amp; Intermediate Form (cont.)</a:t>
             </a:r>
             <a:endParaRPr/>
           </a:p>
@@ -6614,7 +7694,7 @@
       </p:sp>
       <p:sp>
         <p:nvSpPr>
-          <p:cNvPr id="85" name="Google Shape;85;p18"/>
+          <p:cNvPr id="87" name="Google Shape;87;p18"/>
           <p:cNvSpPr txBox="1"/>
           <p:nvPr>
             <p:ph idx="1" type="body"/>
@@ -6622,8 +7702,8 @@
         </p:nvSpPr>
         <p:spPr>
           <a:xfrm>
-            <a:off x="311700" y="1152475"/>
-            <a:ext cx="8520600" cy="3416400"/>
+            <a:off x="311700" y="1017725"/>
+            <a:ext cx="8383800" cy="3990900"/>
           </a:xfrm>
           <a:prstGeom prst="rect">
             <a:avLst/>
@@ -6631,7 +7711,7 @@
         </p:spPr>
         <p:txBody>
           <a:bodyPr anchorCtr="0" anchor="t" bIns="91425" lIns="91425" spcFirstLastPara="1" rIns="91425" wrap="square" tIns="91425">
-            <a:normAutofit/>
+            <a:normAutofit lnSpcReduction="10000"/>
           </a:bodyPr>
           <a:lstStyle/>
           <a:p>
@@ -6640,14 +7720,583 @@
                 <a:spcPts val="0"/>
               </a:spcBef>
               <a:spcAft>
-                <a:spcPts val="1200"/>
+                <a:spcPts val="0"/>
               </a:spcAft>
               <a:buNone/>
             </a:pPr>
             <a:r>
-              <a:t/>
+              <a:rPr lang="en" sz="1100">
+                <a:solidFill>
+                  <a:schemeClr val="dk1"/>
+                </a:solidFill>
+              </a:rPr>
+              <a:t>The following nodes are implemented in the Parser:</a:t>
             </a:r>
-            <a:endParaRPr/>
+            <a:endParaRPr sz="1100">
+              <a:solidFill>
+                <a:schemeClr val="dk1"/>
+              </a:solidFill>
+            </a:endParaRPr>
+          </a:p>
+          <a:p>
+            <a:pPr indent="-298450" lvl="0" marL="457200" rtl="0" algn="l">
+              <a:spcBef>
+                <a:spcPts val="0"/>
+              </a:spcBef>
+              <a:spcAft>
+                <a:spcPts val="0"/>
+              </a:spcAft>
+              <a:buClr>
+                <a:schemeClr val="dk1"/>
+              </a:buClr>
+              <a:buSzPts val="1100"/>
+              <a:buChar char="●"/>
+            </a:pPr>
+            <a:r>
+              <a:rPr lang="en" sz="1100">
+                <a:solidFill>
+                  <a:schemeClr val="dk1"/>
+                </a:solidFill>
+              </a:rPr>
+              <a:t>Block</a:t>
+            </a:r>
+            <a:endParaRPr sz="1100">
+              <a:solidFill>
+                <a:schemeClr val="dk1"/>
+              </a:solidFill>
+            </a:endParaRPr>
+          </a:p>
+          <a:p>
+            <a:pPr indent="-298450" lvl="1" marL="914400" rtl="0" algn="l">
+              <a:spcBef>
+                <a:spcPts val="0"/>
+              </a:spcBef>
+              <a:spcAft>
+                <a:spcPts val="0"/>
+              </a:spcAft>
+              <a:buClr>
+                <a:schemeClr val="dk1"/>
+              </a:buClr>
+              <a:buSzPts val="1100"/>
+              <a:buChar char="○"/>
+            </a:pPr>
+            <a:r>
+              <a:rPr lang="en" sz="1100">
+                <a:solidFill>
+                  <a:schemeClr val="dk1"/>
+                </a:solidFill>
+              </a:rPr>
+              <a:t>block</a:t>
+            </a:r>
+            <a:endParaRPr sz="1100">
+              <a:solidFill>
+                <a:schemeClr val="dk1"/>
+              </a:solidFill>
+            </a:endParaRPr>
+          </a:p>
+          <a:p>
+            <a:pPr indent="-298450" lvl="0" marL="457200" rtl="0" algn="l">
+              <a:spcBef>
+                <a:spcPts val="0"/>
+              </a:spcBef>
+              <a:spcAft>
+                <a:spcPts val="0"/>
+              </a:spcAft>
+              <a:buClr>
+                <a:schemeClr val="dk1"/>
+              </a:buClr>
+              <a:buSzPts val="1100"/>
+              <a:buChar char="●"/>
+            </a:pPr>
+            <a:r>
+              <a:rPr lang="en" sz="1100">
+                <a:solidFill>
+                  <a:schemeClr val="dk1"/>
+                </a:solidFill>
+              </a:rPr>
+              <a:t>Command</a:t>
+            </a:r>
+            <a:endParaRPr sz="1100">
+              <a:solidFill>
+                <a:schemeClr val="dk1"/>
+              </a:solidFill>
+            </a:endParaRPr>
+          </a:p>
+          <a:p>
+            <a:pPr indent="-298450" lvl="1" marL="914400" rtl="0" algn="l">
+              <a:spcBef>
+                <a:spcPts val="0"/>
+              </a:spcBef>
+              <a:spcAft>
+                <a:spcPts val="0"/>
+              </a:spcAft>
+              <a:buClr>
+                <a:schemeClr val="dk1"/>
+              </a:buClr>
+              <a:buSzPts val="1100"/>
+              <a:buChar char="○"/>
+            </a:pPr>
+            <a:r>
+              <a:rPr lang="en" sz="1100">
+                <a:solidFill>
+                  <a:schemeClr val="dk1"/>
+                </a:solidFill>
+              </a:rPr>
+              <a:t>assgn_num, assgn_bool, assgn_str</a:t>
+            </a:r>
+            <a:endParaRPr sz="1100">
+              <a:solidFill>
+                <a:schemeClr val="dk1"/>
+              </a:solidFill>
+            </a:endParaRPr>
+          </a:p>
+          <a:p>
+            <a:pPr indent="-298450" lvl="1" marL="914400" rtl="0" algn="l">
+              <a:spcBef>
+                <a:spcPts val="0"/>
+              </a:spcBef>
+              <a:spcAft>
+                <a:spcPts val="0"/>
+              </a:spcAft>
+              <a:buClr>
+                <a:schemeClr val="dk1"/>
+              </a:buClr>
+              <a:buSzPts val="1100"/>
+              <a:buChar char="○"/>
+            </a:pPr>
+            <a:r>
+              <a:rPr lang="en" sz="1100">
+                <a:solidFill>
+                  <a:schemeClr val="dk1"/>
+                </a:solidFill>
+              </a:rPr>
+              <a:t>if, tern, while, for, for_range</a:t>
+            </a:r>
+            <a:endParaRPr sz="1100">
+              <a:solidFill>
+                <a:schemeClr val="dk1"/>
+              </a:solidFill>
+            </a:endParaRPr>
+          </a:p>
+          <a:p>
+            <a:pPr indent="-298450" lvl="1" marL="914400" rtl="0" algn="l">
+              <a:spcBef>
+                <a:spcPts val="0"/>
+              </a:spcBef>
+              <a:spcAft>
+                <a:spcPts val="0"/>
+              </a:spcAft>
+              <a:buClr>
+                <a:schemeClr val="dk1"/>
+              </a:buClr>
+              <a:buSzPts val="1100"/>
+              <a:buChar char="○"/>
+            </a:pPr>
+            <a:r>
+              <a:rPr lang="en" sz="1100">
+                <a:solidFill>
+                  <a:schemeClr val="dk1"/>
+                </a:solidFill>
+              </a:rPr>
+              <a:t>print</a:t>
+            </a:r>
+            <a:endParaRPr sz="1100">
+              <a:solidFill>
+                <a:schemeClr val="dk1"/>
+              </a:solidFill>
+            </a:endParaRPr>
+          </a:p>
+          <a:p>
+            <a:pPr indent="-298450" lvl="0" marL="457200" rtl="0" algn="l">
+              <a:spcBef>
+                <a:spcPts val="0"/>
+              </a:spcBef>
+              <a:spcAft>
+                <a:spcPts val="0"/>
+              </a:spcAft>
+              <a:buClr>
+                <a:schemeClr val="dk1"/>
+              </a:buClr>
+              <a:buSzPts val="1100"/>
+              <a:buChar char="●"/>
+            </a:pPr>
+            <a:r>
+              <a:rPr lang="en" sz="1100">
+                <a:solidFill>
+                  <a:schemeClr val="dk1"/>
+                </a:solidFill>
+              </a:rPr>
+              <a:t>Boolean Expression</a:t>
+            </a:r>
+            <a:endParaRPr sz="1100">
+              <a:solidFill>
+                <a:schemeClr val="dk1"/>
+              </a:solidFill>
+            </a:endParaRPr>
+          </a:p>
+          <a:p>
+            <a:pPr indent="-298450" lvl="1" marL="914400" rtl="0" algn="l">
+              <a:spcBef>
+                <a:spcPts val="0"/>
+              </a:spcBef>
+              <a:spcAft>
+                <a:spcPts val="0"/>
+              </a:spcAft>
+              <a:buClr>
+                <a:schemeClr val="dk1"/>
+              </a:buClr>
+              <a:buSzPts val="1100"/>
+              <a:buChar char="○"/>
+            </a:pPr>
+            <a:r>
+              <a:rPr lang="en" sz="1100">
+                <a:solidFill>
+                  <a:schemeClr val="dk1"/>
+                </a:solidFill>
+              </a:rPr>
+              <a:t>bool_expr</a:t>
+            </a:r>
+            <a:endParaRPr sz="1100">
+              <a:solidFill>
+                <a:schemeClr val="dk1"/>
+              </a:solidFill>
+            </a:endParaRPr>
+          </a:p>
+          <a:p>
+            <a:pPr indent="-298450" lvl="1" marL="914400" rtl="0" algn="l">
+              <a:spcBef>
+                <a:spcPts val="0"/>
+              </a:spcBef>
+              <a:spcAft>
+                <a:spcPts val="0"/>
+              </a:spcAft>
+              <a:buClr>
+                <a:schemeClr val="dk1"/>
+              </a:buClr>
+              <a:buSzPts val="1100"/>
+              <a:buChar char="○"/>
+            </a:pPr>
+            <a:r>
+              <a:rPr lang="en" sz="1100">
+                <a:solidFill>
+                  <a:schemeClr val="dk1"/>
+                </a:solidFill>
+              </a:rPr>
+              <a:t>and_expr, not_expr, not, eq</a:t>
+            </a:r>
+            <a:endParaRPr sz="1100">
+              <a:solidFill>
+                <a:schemeClr val="dk1"/>
+              </a:solidFill>
+            </a:endParaRPr>
+          </a:p>
+          <a:p>
+            <a:pPr indent="-298450" lvl="0" marL="457200" rtl="0" algn="l">
+              <a:spcBef>
+                <a:spcPts val="0"/>
+              </a:spcBef>
+              <a:spcAft>
+                <a:spcPts val="0"/>
+              </a:spcAft>
+              <a:buClr>
+                <a:schemeClr val="dk1"/>
+              </a:buClr>
+              <a:buSzPts val="1100"/>
+              <a:buChar char="●"/>
+            </a:pPr>
+            <a:r>
+              <a:rPr lang="en" sz="1100">
+                <a:solidFill>
+                  <a:schemeClr val="dk1"/>
+                </a:solidFill>
+              </a:rPr>
+              <a:t>Arithmetic Expression</a:t>
+            </a:r>
+            <a:endParaRPr sz="1100">
+              <a:solidFill>
+                <a:schemeClr val="dk1"/>
+              </a:solidFill>
+            </a:endParaRPr>
+          </a:p>
+          <a:p>
+            <a:pPr indent="-298450" lvl="1" marL="914400" rtl="0" algn="l">
+              <a:spcBef>
+                <a:spcPts val="0"/>
+              </a:spcBef>
+              <a:spcAft>
+                <a:spcPts val="0"/>
+              </a:spcAft>
+              <a:buClr>
+                <a:schemeClr val="dk1"/>
+              </a:buClr>
+              <a:buSzPts val="1100"/>
+              <a:buChar char="○"/>
+            </a:pPr>
+            <a:r>
+              <a:rPr lang="en" sz="1100">
+                <a:solidFill>
+                  <a:schemeClr val="dk1"/>
+                </a:solidFill>
+              </a:rPr>
+              <a:t>add_expr, sub_expr, term</a:t>
+            </a:r>
+            <a:endParaRPr sz="1100">
+              <a:solidFill>
+                <a:schemeClr val="dk1"/>
+              </a:solidFill>
+            </a:endParaRPr>
+          </a:p>
+          <a:p>
+            <a:pPr indent="-298450" lvl="1" marL="914400" rtl="0" algn="l">
+              <a:spcBef>
+                <a:spcPts val="0"/>
+              </a:spcBef>
+              <a:spcAft>
+                <a:spcPts val="0"/>
+              </a:spcAft>
+              <a:buClr>
+                <a:schemeClr val="dk1"/>
+              </a:buClr>
+              <a:buSzPts val="1100"/>
+              <a:buChar char="○"/>
+            </a:pPr>
+            <a:r>
+              <a:rPr lang="en" sz="1100">
+                <a:solidFill>
+                  <a:schemeClr val="dk1"/>
+                </a:solidFill>
+              </a:rPr>
+              <a:t>div_term, mult_term, factor_term</a:t>
+            </a:r>
+            <a:endParaRPr sz="1100">
+              <a:solidFill>
+                <a:schemeClr val="dk1"/>
+              </a:solidFill>
+            </a:endParaRPr>
+          </a:p>
+          <a:p>
+            <a:pPr indent="-298450" lvl="1" marL="914400" rtl="0" algn="l">
+              <a:spcBef>
+                <a:spcPts val="0"/>
+              </a:spcBef>
+              <a:spcAft>
+                <a:spcPts val="0"/>
+              </a:spcAft>
+              <a:buClr>
+                <a:schemeClr val="dk1"/>
+              </a:buClr>
+              <a:buSzPts val="1100"/>
+              <a:buChar char="○"/>
+            </a:pPr>
+            <a:r>
+              <a:rPr lang="en" sz="1100">
+                <a:solidFill>
+                  <a:schemeClr val="dk1"/>
+                </a:solidFill>
+              </a:rPr>
+              <a:t>factor</a:t>
+            </a:r>
+            <a:endParaRPr sz="1100">
+              <a:solidFill>
+                <a:schemeClr val="dk1"/>
+              </a:solidFill>
+            </a:endParaRPr>
+          </a:p>
+          <a:p>
+            <a:pPr indent="-298450" lvl="0" marL="457200" rtl="0" algn="l">
+              <a:spcBef>
+                <a:spcPts val="0"/>
+              </a:spcBef>
+              <a:spcAft>
+                <a:spcPts val="0"/>
+              </a:spcAft>
+              <a:buClr>
+                <a:schemeClr val="dk1"/>
+              </a:buClr>
+              <a:buSzPts val="1100"/>
+              <a:buChar char="●"/>
+            </a:pPr>
+            <a:r>
+              <a:rPr lang="en" sz="1100">
+                <a:solidFill>
+                  <a:schemeClr val="dk1"/>
+                </a:solidFill>
+              </a:rPr>
+              <a:t>Identifier</a:t>
+            </a:r>
+            <a:endParaRPr sz="1100">
+              <a:solidFill>
+                <a:schemeClr val="dk1"/>
+              </a:solidFill>
+            </a:endParaRPr>
+          </a:p>
+          <a:p>
+            <a:pPr indent="-298450" lvl="1" marL="914400" rtl="0" algn="l">
+              <a:spcBef>
+                <a:spcPts val="0"/>
+              </a:spcBef>
+              <a:spcAft>
+                <a:spcPts val="0"/>
+              </a:spcAft>
+              <a:buClr>
+                <a:schemeClr val="dk1"/>
+              </a:buClr>
+              <a:buSzPts val="1100"/>
+              <a:buChar char="○"/>
+            </a:pPr>
+            <a:r>
+              <a:rPr lang="en" sz="1100">
+                <a:solidFill>
+                  <a:schemeClr val="dk1"/>
+                </a:solidFill>
+              </a:rPr>
+              <a:t>id</a:t>
+            </a:r>
+            <a:endParaRPr sz="1100">
+              <a:solidFill>
+                <a:schemeClr val="dk1"/>
+              </a:solidFill>
+            </a:endParaRPr>
+          </a:p>
+          <a:p>
+            <a:pPr indent="-298450" lvl="0" marL="457200" rtl="0" algn="l">
+              <a:spcBef>
+                <a:spcPts val="0"/>
+              </a:spcBef>
+              <a:spcAft>
+                <a:spcPts val="0"/>
+              </a:spcAft>
+              <a:buClr>
+                <a:schemeClr val="dk1"/>
+              </a:buClr>
+              <a:buSzPts val="1100"/>
+              <a:buChar char="●"/>
+            </a:pPr>
+            <a:r>
+              <a:rPr lang="en" sz="1100">
+                <a:solidFill>
+                  <a:schemeClr val="dk1"/>
+                </a:solidFill>
+              </a:rPr>
+              <a:t>String Expression</a:t>
+            </a:r>
+            <a:endParaRPr sz="1100">
+              <a:solidFill>
+                <a:schemeClr val="dk1"/>
+              </a:solidFill>
+            </a:endParaRPr>
+          </a:p>
+          <a:p>
+            <a:pPr indent="-298450" lvl="1" marL="914400" rtl="0" algn="l">
+              <a:spcBef>
+                <a:spcPts val="0"/>
+              </a:spcBef>
+              <a:spcAft>
+                <a:spcPts val="0"/>
+              </a:spcAft>
+              <a:buClr>
+                <a:schemeClr val="dk1"/>
+              </a:buClr>
+              <a:buSzPts val="1100"/>
+              <a:buChar char="○"/>
+            </a:pPr>
+            <a:r>
+              <a:rPr lang="en" sz="1100">
+                <a:solidFill>
+                  <a:schemeClr val="dk1"/>
+                </a:solidFill>
+              </a:rPr>
+              <a:t>str_expr</a:t>
+            </a:r>
+            <a:endParaRPr sz="1100">
+              <a:solidFill>
+                <a:schemeClr val="dk1"/>
+              </a:solidFill>
+            </a:endParaRPr>
+          </a:p>
+          <a:p>
+            <a:pPr indent="-298450" lvl="1" marL="914400" rtl="0" algn="l">
+              <a:spcBef>
+                <a:spcPts val="0"/>
+              </a:spcBef>
+              <a:spcAft>
+                <a:spcPts val="0"/>
+              </a:spcAft>
+              <a:buClr>
+                <a:schemeClr val="dk1"/>
+              </a:buClr>
+              <a:buSzPts val="1100"/>
+              <a:buChar char="○"/>
+            </a:pPr>
+            <a:r>
+              <a:rPr lang="en" sz="1100">
+                <a:solidFill>
+                  <a:schemeClr val="dk1"/>
+                </a:solidFill>
+              </a:rPr>
+              <a:t>str</a:t>
+            </a:r>
+            <a:endParaRPr sz="1100">
+              <a:solidFill>
+                <a:schemeClr val="dk1"/>
+              </a:solidFill>
+            </a:endParaRPr>
+          </a:p>
+          <a:p>
+            <a:pPr indent="-298450" lvl="0" marL="457200" rtl="0" algn="l">
+              <a:spcBef>
+                <a:spcPts val="0"/>
+              </a:spcBef>
+              <a:spcAft>
+                <a:spcPts val="0"/>
+              </a:spcAft>
+              <a:buClr>
+                <a:schemeClr val="dk1"/>
+              </a:buClr>
+              <a:buSzPts val="1100"/>
+              <a:buChar char="●"/>
+            </a:pPr>
+            <a:r>
+              <a:rPr lang="en" sz="1100">
+                <a:solidFill>
+                  <a:schemeClr val="dk1"/>
+                </a:solidFill>
+              </a:rPr>
+              <a:t>Number</a:t>
+            </a:r>
+            <a:endParaRPr sz="1100">
+              <a:solidFill>
+                <a:schemeClr val="dk1"/>
+              </a:solidFill>
+            </a:endParaRPr>
+          </a:p>
+          <a:p>
+            <a:pPr indent="-298450" lvl="1" marL="914400" rtl="0" algn="l">
+              <a:spcBef>
+                <a:spcPts val="0"/>
+              </a:spcBef>
+              <a:spcAft>
+                <a:spcPts val="0"/>
+              </a:spcAft>
+              <a:buClr>
+                <a:schemeClr val="dk1"/>
+              </a:buClr>
+              <a:buSzPts val="1100"/>
+              <a:buChar char="○"/>
+            </a:pPr>
+            <a:r>
+              <a:rPr lang="en" sz="1100">
+                <a:solidFill>
+                  <a:schemeClr val="dk1"/>
+                </a:solidFill>
+              </a:rPr>
+              <a:t>num</a:t>
+            </a:r>
+            <a:endParaRPr sz="1100">
+              <a:solidFill>
+                <a:schemeClr val="dk1"/>
+              </a:solidFill>
+            </a:endParaRPr>
           </a:p>
         </p:txBody>
       </p:sp>
@@ -6664,7 +8313,7 @@
   <p:cSld>
     <p:spTree>
       <p:nvGrpSpPr>
-        <p:cNvPr id="89" name="Shape 89"/>
+        <p:cNvPr id="91" name="Shape 91"/>
         <p:cNvGrpSpPr/>
         <p:nvPr/>
       </p:nvGrpSpPr>
@@ -6678,7 +8327,7 @@
       </p:grpSpPr>
       <p:sp>
         <p:nvSpPr>
-          <p:cNvPr id="90" name="Google Shape;90;p19"/>
+          <p:cNvPr id="92" name="Google Shape;92;p19"/>
           <p:cNvSpPr txBox="1"/>
           <p:nvPr>
             <p:ph type="title"/>
@@ -6710,7 +8359,7 @@
             </a:pPr>
             <a:r>
               <a:rPr lang="en"/>
-              <a:t>Installation &amp; Runtime Compiler</a:t>
+              <a:t>Interpreter</a:t>
             </a:r>
             <a:endParaRPr/>
           </a:p>
@@ -6718,7 +8367,267 @@
       </p:sp>
       <p:sp>
         <p:nvSpPr>
-          <p:cNvPr id="91" name="Google Shape;91;p19"/>
+          <p:cNvPr id="93" name="Google Shape;93;p19"/>
+          <p:cNvSpPr txBox="1"/>
+          <p:nvPr>
+            <p:ph idx="1" type="body"/>
+          </p:nvPr>
+        </p:nvSpPr>
+        <p:spPr>
+          <a:xfrm>
+            <a:off x="311700" y="1152475"/>
+            <a:ext cx="8520600" cy="1674300"/>
+          </a:xfrm>
+          <a:prstGeom prst="rect">
+            <a:avLst/>
+          </a:prstGeom>
+        </p:spPr>
+        <p:txBody>
+          <a:bodyPr anchorCtr="0" anchor="t" bIns="91425" lIns="91425" spcFirstLastPara="1" rIns="91425" wrap="square" tIns="91425">
+            <a:normAutofit/>
+          </a:bodyPr>
+          <a:lstStyle/>
+          <a:p>
+            <a:pPr indent="0" lvl="0" marL="0" rtl="0" algn="l">
+              <a:spcBef>
+                <a:spcPts val="0"/>
+              </a:spcBef>
+              <a:spcAft>
+                <a:spcPts val="0"/>
+              </a:spcAft>
+              <a:buNone/>
+            </a:pPr>
+            <a:r>
+              <a:rPr lang="en" sz="1100">
+                <a:solidFill>
+                  <a:schemeClr val="dk1"/>
+                </a:solidFill>
+              </a:rPr>
+              <a:t>The Interpreter is implemented in Prolog. It takes the parse tree generated by the Parser as input and executes the program represented by the parse tree. All programs </a:t>
+            </a:r>
+            <a:r>
+              <a:rPr i="1" lang="en" sz="1100">
+                <a:solidFill>
+                  <a:schemeClr val="dk1"/>
+                </a:solidFill>
+              </a:rPr>
+              <a:t>must assign</a:t>
+            </a:r>
+            <a:r>
+              <a:rPr lang="en" sz="1100">
+                <a:solidFill>
+                  <a:schemeClr val="dk1"/>
+                </a:solidFill>
+              </a:rPr>
+              <a:t> a value to identifier z, which is the value returned by the interpreter.</a:t>
+            </a:r>
+            <a:endParaRPr sz="1100">
+              <a:solidFill>
+                <a:schemeClr val="dk1"/>
+              </a:solidFill>
+            </a:endParaRPr>
+          </a:p>
+          <a:p>
+            <a:pPr indent="0" lvl="0" marL="0" rtl="0" algn="l">
+              <a:spcBef>
+                <a:spcPts val="0"/>
+              </a:spcBef>
+              <a:spcAft>
+                <a:spcPts val="0"/>
+              </a:spcAft>
+              <a:buNone/>
+            </a:pPr>
+            <a:r>
+              <a:t/>
+            </a:r>
+            <a:endParaRPr sz="1100">
+              <a:solidFill>
+                <a:schemeClr val="dk1"/>
+              </a:solidFill>
+            </a:endParaRPr>
+          </a:p>
+          <a:p>
+            <a:pPr indent="0" lvl="0" marL="0" rtl="0" algn="l">
+              <a:spcBef>
+                <a:spcPts val="0"/>
+              </a:spcBef>
+              <a:spcAft>
+                <a:spcPts val="0"/>
+              </a:spcAft>
+              <a:buNone/>
+            </a:pPr>
+            <a:r>
+              <a:rPr lang="en" sz="1100">
+                <a:solidFill>
+                  <a:schemeClr val="dk1"/>
+                </a:solidFill>
+              </a:rPr>
+              <a:t>To invoke the interpreter only, the following command can be used in a Prolog interpreter, where T is the parse tree generated by the Parser, and Ret is the return value: </a:t>
+            </a:r>
+            <a:r>
+              <a:rPr lang="en" sz="1100">
+                <a:solidFill>
+                  <a:schemeClr val="dk1"/>
+                </a:solidFill>
+                <a:latin typeface="Roboto Mono"/>
+                <a:ea typeface="Roboto Mono"/>
+                <a:cs typeface="Roboto Mono"/>
+                <a:sym typeface="Roboto Mono"/>
+              </a:rPr>
+              <a:t>program_eval(T, Ret).</a:t>
+            </a:r>
+            <a:endParaRPr sz="1100">
+              <a:solidFill>
+                <a:schemeClr val="dk1"/>
+              </a:solidFill>
+            </a:endParaRPr>
+          </a:p>
+          <a:p>
+            <a:pPr indent="0" lvl="0" marL="0" rtl="0" algn="l">
+              <a:spcBef>
+                <a:spcPts val="0"/>
+              </a:spcBef>
+              <a:spcAft>
+                <a:spcPts val="0"/>
+              </a:spcAft>
+              <a:buNone/>
+            </a:pPr>
+            <a:r>
+              <a:t/>
+            </a:r>
+            <a:endParaRPr sz="1100">
+              <a:solidFill>
+                <a:schemeClr val="dk1"/>
+              </a:solidFill>
+            </a:endParaRPr>
+          </a:p>
+          <a:p>
+            <a:pPr indent="0" lvl="0" marL="0" rtl="0" algn="l">
+              <a:spcBef>
+                <a:spcPts val="0"/>
+              </a:spcBef>
+              <a:spcAft>
+                <a:spcPts val="0"/>
+              </a:spcAft>
+              <a:buClr>
+                <a:schemeClr val="dk1"/>
+              </a:buClr>
+              <a:buSzPts val="1100"/>
+              <a:buFont typeface="Arial"/>
+              <a:buNone/>
+            </a:pPr>
+            <a:r>
+              <a:rPr lang="en" sz="1100">
+                <a:solidFill>
+                  <a:schemeClr val="dk1"/>
+                </a:solidFill>
+              </a:rPr>
+              <a:t>A sample usage is shown below:</a:t>
+            </a:r>
+            <a:endParaRPr sz="1100">
+              <a:solidFill>
+                <a:schemeClr val="dk1"/>
+              </a:solidFill>
+            </a:endParaRPr>
+          </a:p>
+        </p:txBody>
+      </p:sp>
+      <p:pic>
+        <p:nvPicPr>
+          <p:cNvPr id="94" name="Google Shape;94;p19"/>
+          <p:cNvPicPr preferRelativeResize="0"/>
+          <p:nvPr/>
+        </p:nvPicPr>
+        <p:blipFill>
+          <a:blip r:embed="rId3">
+            <a:alphaModFix/>
+          </a:blip>
+          <a:stretch>
+            <a:fillRect/>
+          </a:stretch>
+        </p:blipFill>
+        <p:spPr>
+          <a:xfrm>
+            <a:off x="152400" y="2979175"/>
+            <a:ext cx="8839202" cy="1148481"/>
+          </a:xfrm>
+          <a:prstGeom prst="rect">
+            <a:avLst/>
+          </a:prstGeom>
+          <a:noFill/>
+          <a:ln>
+            <a:noFill/>
+          </a:ln>
+        </p:spPr>
+      </p:pic>
+    </p:spTree>
+  </p:cSld>
+  <p:clrMapOvr>
+    <a:masterClrMapping/>
+  </p:clrMapOvr>
+</p:sld>
+</file>
+
+<file path=ppt/slides/slide8.xml><?xml version="1.0" encoding="utf-8"?>
+<p:sld xmlns:a="http://schemas.openxmlformats.org/drawingml/2006/main" xmlns:r="http://schemas.openxmlformats.org/officeDocument/2006/relationships" xmlns:mc="http://schemas.openxmlformats.org/markup-compatibility/2006" xmlns:mv="urn:schemas-microsoft-com:mac:vml" xmlns:p="http://schemas.openxmlformats.org/presentationml/2006/main" xmlns:c="http://schemas.openxmlformats.org/drawingml/2006/chart" xmlns:dgm="http://schemas.openxmlformats.org/drawingml/2006/diagram" xmlns:o="urn:schemas-microsoft-com:office:office" xmlns:v="urn:schemas-microsoft-com:vml" xmlns:pvml="urn:schemas-microsoft-com:office:powerpoint" xmlns:com="http://schemas.openxmlformats.org/drawingml/2006/compatibility" xmlns:p14="http://schemas.microsoft.com/office/powerpoint/2010/main" xmlns:p15="http://schemas.microsoft.com/office/powerpoint/2012/main" xmlns:ahyp="http://schemas.microsoft.com/office/drawing/2018/hyperlinkcolor">
+  <p:cSld>
+    <p:spTree>
+      <p:nvGrpSpPr>
+        <p:cNvPr id="98" name="Shape 98"/>
+        <p:cNvGrpSpPr/>
+        <p:nvPr/>
+      </p:nvGrpSpPr>
+      <p:grpSpPr>
+        <a:xfrm>
+          <a:off x="0" y="0"/>
+          <a:ext cx="0" cy="0"/>
+          <a:chOff x="0" y="0"/>
+          <a:chExt cx="0" cy="0"/>
+        </a:xfrm>
+      </p:grpSpPr>
+      <p:sp>
+        <p:nvSpPr>
+          <p:cNvPr id="99" name="Google Shape;99;p20"/>
+          <p:cNvSpPr txBox="1"/>
+          <p:nvPr>
+            <p:ph type="title"/>
+          </p:nvPr>
+        </p:nvSpPr>
+        <p:spPr>
+          <a:xfrm>
+            <a:off x="311700" y="445025"/>
+            <a:ext cx="8520600" cy="572700"/>
+          </a:xfrm>
+          <a:prstGeom prst="rect">
+            <a:avLst/>
+          </a:prstGeom>
+        </p:spPr>
+        <p:txBody>
+          <a:bodyPr anchorCtr="0" anchor="t" bIns="91425" lIns="91425" spcFirstLastPara="1" rIns="91425" wrap="square" tIns="91425">
+            <a:normAutofit fontScale="90000"/>
+          </a:bodyPr>
+          <a:lstStyle/>
+          <a:p>
+            <a:pPr indent="0" lvl="0" marL="0" rtl="0" algn="l">
+              <a:spcBef>
+                <a:spcPts val="0"/>
+              </a:spcBef>
+              <a:spcAft>
+                <a:spcPts val="0"/>
+              </a:spcAft>
+              <a:buNone/>
+            </a:pPr>
+            <a:r>
+              <a:rPr lang="en"/>
+              <a:t>Installation &amp; Runtime Compiler</a:t>
+            </a:r>
+            <a:endParaRPr/>
+          </a:p>
+        </p:txBody>
+      </p:sp>
+      <p:sp>
+        <p:nvSpPr>
+          <p:cNvPr id="100" name="Google Shape;100;p20"/>
           <p:cNvSpPr txBox="1"/>
           <p:nvPr>
             <p:ph idx="1" type="body"/>

</xml_diff>